<commit_message>
few docs updated, a bug I found on import compounds fixed.
</commit_message>
<xml_diff>
--- a/Presentation Slides/Presentation 6.pptx
+++ b/Presentation Slides/Presentation 6.pptx
@@ -17,8 +17,11 @@
     <p:sldId id="276" r:id="rId11"/>
     <p:sldId id="283" r:id="rId12"/>
     <p:sldId id="262" r:id="rId13"/>
-    <p:sldId id="265" r:id="rId14"/>
-    <p:sldId id="284" r:id="rId15"/>
+    <p:sldId id="287" r:id="rId14"/>
+    <p:sldId id="285" r:id="rId15"/>
+    <p:sldId id="286" r:id="rId16"/>
+    <p:sldId id="265" r:id="rId17"/>
+    <p:sldId id="284" r:id="rId18"/>
   </p:sldIdLst>
   <p:sldSz cx="9144000" cy="6858000" type="screen4x3"/>
   <p:notesSz cx="6858000" cy="9144000"/>
@@ -119,7 +122,7 @@
   </p:defaultTextStyle>
   <p:extLst>
     <p:ext uri="{EFAFB233-063F-42B5-8137-9DF3F51BA10A}">
-      <p15:sldGuideLst xmlns="" xmlns:p15="http://schemas.microsoft.com/office/powerpoint/2012/main">
+      <p15:sldGuideLst xmlns:p15="http://schemas.microsoft.com/office/powerpoint/2012/main" xmlns="">
         <p15:guide id="1" orient="horz" pos="2160">
           <p15:clr>
             <a:srgbClr val="A4A3A4"/>
@@ -3672,105 +3675,66 @@
           <a:p>
             <a:r>
               <a:rPr lang="en-US" dirty="0" smtClean="0"/>
-              <a:t>Documents updated</a:t>
+              <a:t>Designed documents</a:t>
             </a:r>
             <a:endParaRPr lang="en-US" dirty="0"/>
           </a:p>
         </p:txBody>
       </p:sp>
-      <p:sp>
-        <p:nvSpPr>
-          <p:cNvPr id="3" name="Content Placeholder 2"/>
-          <p:cNvSpPr>
-            <a:spLocks noGrp="1"/>
-          </p:cNvSpPr>
-          <p:nvPr>
-            <p:ph idx="1"/>
-          </p:nvPr>
-        </p:nvSpPr>
-        <p:spPr/>
-        <p:txBody>
-          <a:bodyPr>
-            <a:normAutofit fontScale="85000" lnSpcReduction="20000"/>
-          </a:bodyPr>
-          <a:lstStyle/>
-          <a:p>
-            <a:pPr marL="0" indent="0">
-              <a:buNone/>
-            </a:pPr>
-            <a:endParaRPr lang="en-US" dirty="0"/>
-          </a:p>
-          <a:p>
-            <a:pPr marL="0" indent="0">
-              <a:buNone/>
-            </a:pPr>
-            <a:r>
-              <a:rPr lang="en-US" dirty="0" smtClean="0"/>
-              <a:t>Feasibility Study</a:t>
-            </a:r>
-          </a:p>
-          <a:p>
-            <a:pPr marL="0" indent="0">
-              <a:buNone/>
-            </a:pPr>
-            <a:endParaRPr lang="en-US" dirty="0"/>
-          </a:p>
-          <a:p>
-            <a:pPr marL="0" indent="0">
-              <a:buNone/>
-            </a:pPr>
-            <a:r>
-              <a:rPr lang="en-US" dirty="0" smtClean="0"/>
-              <a:t>Required Documents</a:t>
-            </a:r>
-          </a:p>
-          <a:p>
-            <a:pPr marL="0" indent="0">
-              <a:buNone/>
-            </a:pPr>
-            <a:endParaRPr lang="en-US" dirty="0"/>
-          </a:p>
-          <a:p>
-            <a:pPr marL="0" indent="0">
-              <a:buNone/>
-            </a:pPr>
-            <a:r>
-              <a:rPr lang="en-US" dirty="0" smtClean="0"/>
-              <a:t>Design Document </a:t>
-            </a:r>
-          </a:p>
-          <a:p>
-            <a:pPr marL="0" indent="0">
-              <a:buNone/>
-            </a:pPr>
-            <a:endParaRPr lang="en-US" dirty="0"/>
-          </a:p>
-          <a:p>
-            <a:pPr marL="0" indent="0">
-              <a:buNone/>
-            </a:pPr>
-            <a:r>
-              <a:rPr lang="en-US" dirty="0" smtClean="0"/>
-              <a:t>User Manual</a:t>
-            </a:r>
-          </a:p>
-          <a:p>
-            <a:pPr marL="0" indent="0">
-              <a:buNone/>
-            </a:pPr>
-            <a:endParaRPr lang="en-US" dirty="0"/>
-          </a:p>
-          <a:p>
-            <a:pPr marL="0" indent="0">
-              <a:buNone/>
-            </a:pPr>
-            <a:r>
-              <a:rPr lang="en-US" dirty="0" smtClean="0"/>
-              <a:t>Installation guide</a:t>
-            </a:r>
-          </a:p>
-        </p:txBody>
-      </p:sp>
+      <p:pic>
+        <p:nvPicPr>
+          <p:cNvPr id="1027" name="Picture 3"/>
+          <p:cNvPicPr>
+            <a:picLocks noChangeAspect="1" noChangeArrowheads="1"/>
+          </p:cNvPicPr>
+          <p:nvPr/>
+        </p:nvPicPr>
+        <p:blipFill>
+          <a:blip r:embed="rId2">
+            <a:extLst>
+              <a:ext uri="{28A0092B-C50C-407E-A947-70E740481C1C}">
+                <a14:useLocalDpi xmlns:a14="http://schemas.microsoft.com/office/drawing/2010/main" val="0"/>
+              </a:ext>
+            </a:extLst>
+          </a:blip>
+          <a:srcRect/>
+          <a:stretch>
+            <a:fillRect/>
+          </a:stretch>
+        </p:blipFill>
+        <p:spPr bwMode="auto">
+          <a:xfrm>
+            <a:off x="304800" y="1143000"/>
+            <a:ext cx="8505825" cy="5600700"/>
+          </a:xfrm>
+          <a:prstGeom prst="rect">
+            <a:avLst/>
+          </a:prstGeom>
+          <a:noFill/>
+          <a:ln>
+            <a:noFill/>
+          </a:ln>
+          <a:extLst>
+            <a:ext uri="{909E8E84-426E-40DD-AFC4-6F175D3DCCD1}">
+              <a14:hiddenFill xmlns:a14="http://schemas.microsoft.com/office/drawing/2010/main">
+                <a:solidFill>
+                  <a:schemeClr val="accent1"/>
+                </a:solidFill>
+              </a14:hiddenFill>
+            </a:ext>
+            <a:ext uri="{91240B29-F687-4F45-9708-019B960494DF}">
+              <a14:hiddenLine xmlns:a14="http://schemas.microsoft.com/office/drawing/2010/main" w="9525">
+                <a:solidFill>
+                  <a:schemeClr val="tx1"/>
+                </a:solidFill>
+                <a:miter lim="800000"/>
+                <a:headEnd/>
+                <a:tailEnd/>
+              </a14:hiddenLine>
+            </a:ext>
+          </a:extLst>
+        </p:spPr>
+      </p:pic>
     </p:spTree>
     <p:extLst>
       <p:ext uri="{BB962C8B-B14F-4D97-AF65-F5344CB8AC3E}">
@@ -3792,6 +3756,331 @@
 </file>
 
 <file path=ppt/slides/slide13.xml><?xml version="1.0" encoding="utf-8"?>
+<p:sld xmlns:a="http://schemas.openxmlformats.org/drawingml/2006/main" xmlns:r="http://schemas.openxmlformats.org/officeDocument/2006/relationships" xmlns:p="http://schemas.openxmlformats.org/presentationml/2006/main">
+  <p:cSld>
+    <p:spTree>
+      <p:nvGrpSpPr>
+        <p:cNvPr id="1" name=""/>
+        <p:cNvGrpSpPr/>
+        <p:nvPr/>
+      </p:nvGrpSpPr>
+      <p:grpSpPr>
+        <a:xfrm>
+          <a:off x="0" y="0"/>
+          <a:ext cx="0" cy="0"/>
+          <a:chOff x="0" y="0"/>
+          <a:chExt cx="0" cy="0"/>
+        </a:xfrm>
+      </p:grpSpPr>
+      <p:sp>
+        <p:nvSpPr>
+          <p:cNvPr id="2" name="Title 1"/>
+          <p:cNvSpPr>
+            <a:spLocks noGrp="1"/>
+          </p:cNvSpPr>
+          <p:nvPr>
+            <p:ph type="title"/>
+          </p:nvPr>
+        </p:nvSpPr>
+        <p:spPr/>
+        <p:txBody>
+          <a:bodyPr/>
+          <a:lstStyle/>
+          <a:p>
+            <a:r>
+              <a:rPr lang="en-US" dirty="0" smtClean="0"/>
+              <a:t>User Manual</a:t>
+            </a:r>
+            <a:endParaRPr lang="en-US" dirty="0"/>
+          </a:p>
+        </p:txBody>
+      </p:sp>
+      <p:pic>
+        <p:nvPicPr>
+          <p:cNvPr id="4098" name="Picture 2"/>
+          <p:cNvPicPr>
+            <a:picLocks noChangeAspect="1" noChangeArrowheads="1"/>
+          </p:cNvPicPr>
+          <p:nvPr/>
+        </p:nvPicPr>
+        <p:blipFill>
+          <a:blip r:embed="rId2">
+            <a:extLst>
+              <a:ext uri="{28A0092B-C50C-407E-A947-70E740481C1C}">
+                <a14:useLocalDpi xmlns:a14="http://schemas.microsoft.com/office/drawing/2010/main" val="0"/>
+              </a:ext>
+            </a:extLst>
+          </a:blip>
+          <a:srcRect/>
+          <a:stretch>
+            <a:fillRect/>
+          </a:stretch>
+        </p:blipFill>
+        <p:spPr bwMode="auto">
+          <a:xfrm>
+            <a:off x="633413" y="1581150"/>
+            <a:ext cx="7877175" cy="4362450"/>
+          </a:xfrm>
+          <a:prstGeom prst="rect">
+            <a:avLst/>
+          </a:prstGeom>
+          <a:noFill/>
+          <a:ln>
+            <a:noFill/>
+          </a:ln>
+          <a:extLst>
+            <a:ext uri="{909E8E84-426E-40DD-AFC4-6F175D3DCCD1}">
+              <a14:hiddenFill xmlns:a14="http://schemas.microsoft.com/office/drawing/2010/main">
+                <a:solidFill>
+                  <a:schemeClr val="accent1"/>
+                </a:solidFill>
+              </a14:hiddenFill>
+            </a:ext>
+            <a:ext uri="{91240B29-F687-4F45-9708-019B960494DF}">
+              <a14:hiddenLine xmlns:a14="http://schemas.microsoft.com/office/drawing/2010/main" w="9525">
+                <a:solidFill>
+                  <a:schemeClr val="tx1"/>
+                </a:solidFill>
+                <a:miter lim="800000"/>
+                <a:headEnd/>
+                <a:tailEnd/>
+              </a14:hiddenLine>
+            </a:ext>
+          </a:extLst>
+        </p:spPr>
+      </p:pic>
+    </p:spTree>
+    <p:extLst>
+      <p:ext uri="{BB962C8B-B14F-4D97-AF65-F5344CB8AC3E}">
+        <p14:creationId xmlns:p14="http://schemas.microsoft.com/office/powerpoint/2010/main" val="3171596413"/>
+      </p:ext>
+    </p:extLst>
+  </p:cSld>
+  <p:clrMapOvr>
+    <a:masterClrMapping/>
+  </p:clrMapOvr>
+</p:sld>
+</file>
+
+<file path=ppt/slides/slide14.xml><?xml version="1.0" encoding="utf-8"?>
+<p:sld xmlns:a="http://schemas.openxmlformats.org/drawingml/2006/main" xmlns:r="http://schemas.openxmlformats.org/officeDocument/2006/relationships" xmlns:p="http://schemas.openxmlformats.org/presentationml/2006/main">
+  <p:cSld>
+    <p:spTree>
+      <p:nvGrpSpPr>
+        <p:cNvPr id="1" name=""/>
+        <p:cNvGrpSpPr/>
+        <p:nvPr/>
+      </p:nvGrpSpPr>
+      <p:grpSpPr>
+        <a:xfrm>
+          <a:off x="0" y="0"/>
+          <a:ext cx="0" cy="0"/>
+          <a:chOff x="0" y="0"/>
+          <a:chExt cx="0" cy="0"/>
+        </a:xfrm>
+      </p:grpSpPr>
+      <p:sp>
+        <p:nvSpPr>
+          <p:cNvPr id="2" name="Title 1"/>
+          <p:cNvSpPr>
+            <a:spLocks noGrp="1"/>
+          </p:cNvSpPr>
+          <p:nvPr>
+            <p:ph type="title"/>
+          </p:nvPr>
+        </p:nvSpPr>
+        <p:spPr/>
+        <p:txBody>
+          <a:bodyPr/>
+          <a:lstStyle/>
+          <a:p>
+            <a:r>
+              <a:rPr lang="en-US" dirty="0" smtClean="0"/>
+              <a:t>Installation guide</a:t>
+            </a:r>
+            <a:endParaRPr lang="en-US" dirty="0"/>
+          </a:p>
+        </p:txBody>
+      </p:sp>
+      <p:pic>
+        <p:nvPicPr>
+          <p:cNvPr id="2050" name="Picture 2"/>
+          <p:cNvPicPr>
+            <a:picLocks noChangeAspect="1" noChangeArrowheads="1"/>
+          </p:cNvPicPr>
+          <p:nvPr/>
+        </p:nvPicPr>
+        <p:blipFill>
+          <a:blip r:embed="rId2">
+            <a:extLst>
+              <a:ext uri="{28A0092B-C50C-407E-A947-70E740481C1C}">
+                <a14:useLocalDpi xmlns:a14="http://schemas.microsoft.com/office/drawing/2010/main" val="0"/>
+              </a:ext>
+            </a:extLst>
+          </a:blip>
+          <a:srcRect/>
+          <a:stretch>
+            <a:fillRect/>
+          </a:stretch>
+        </p:blipFill>
+        <p:spPr bwMode="auto">
+          <a:xfrm>
+            <a:off x="621708" y="1219200"/>
+            <a:ext cx="7915275" cy="5429250"/>
+          </a:xfrm>
+          <a:prstGeom prst="rect">
+            <a:avLst/>
+          </a:prstGeom>
+          <a:noFill/>
+          <a:ln>
+            <a:noFill/>
+          </a:ln>
+          <a:extLst>
+            <a:ext uri="{909E8E84-426E-40DD-AFC4-6F175D3DCCD1}">
+              <a14:hiddenFill xmlns:a14="http://schemas.microsoft.com/office/drawing/2010/main">
+                <a:solidFill>
+                  <a:schemeClr val="accent1"/>
+                </a:solidFill>
+              </a14:hiddenFill>
+            </a:ext>
+            <a:ext uri="{91240B29-F687-4F45-9708-019B960494DF}">
+              <a14:hiddenLine xmlns:a14="http://schemas.microsoft.com/office/drawing/2010/main" w="9525">
+                <a:solidFill>
+                  <a:schemeClr val="tx1"/>
+                </a:solidFill>
+                <a:miter lim="800000"/>
+                <a:headEnd/>
+                <a:tailEnd/>
+              </a14:hiddenLine>
+            </a:ext>
+          </a:extLst>
+        </p:spPr>
+      </p:pic>
+    </p:spTree>
+    <p:extLst>
+      <p:ext uri="{BB962C8B-B14F-4D97-AF65-F5344CB8AC3E}">
+        <p14:creationId xmlns:p14="http://schemas.microsoft.com/office/powerpoint/2010/main" val="1428867742"/>
+      </p:ext>
+    </p:extLst>
+  </p:cSld>
+  <p:clrMapOvr>
+    <a:masterClrMapping/>
+  </p:clrMapOvr>
+</p:sld>
+</file>
+
+<file path=ppt/slides/slide15.xml><?xml version="1.0" encoding="utf-8"?>
+<p:sld xmlns:a="http://schemas.openxmlformats.org/drawingml/2006/main" xmlns:r="http://schemas.openxmlformats.org/officeDocument/2006/relationships" xmlns:p="http://schemas.openxmlformats.org/presentationml/2006/main">
+  <p:cSld>
+    <p:spTree>
+      <p:nvGrpSpPr>
+        <p:cNvPr id="1" name=""/>
+        <p:cNvGrpSpPr/>
+        <p:nvPr/>
+      </p:nvGrpSpPr>
+      <p:grpSpPr>
+        <a:xfrm>
+          <a:off x="0" y="0"/>
+          <a:ext cx="0" cy="0"/>
+          <a:chOff x="0" y="0"/>
+          <a:chExt cx="0" cy="0"/>
+        </a:xfrm>
+      </p:grpSpPr>
+      <p:sp>
+        <p:nvSpPr>
+          <p:cNvPr id="2" name="Title 1"/>
+          <p:cNvSpPr>
+            <a:spLocks noGrp="1"/>
+          </p:cNvSpPr>
+          <p:nvPr>
+            <p:ph type="title"/>
+          </p:nvPr>
+        </p:nvSpPr>
+        <p:spPr/>
+        <p:txBody>
+          <a:bodyPr/>
+          <a:lstStyle/>
+          <a:p>
+            <a:r>
+              <a:rPr lang="en-US" dirty="0" err="1" smtClean="0"/>
+              <a:t>Fesibility</a:t>
+            </a:r>
+            <a:r>
+              <a:rPr lang="en-US" dirty="0" smtClean="0"/>
+              <a:t> Study &amp; Project Plan</a:t>
+            </a:r>
+            <a:endParaRPr lang="en-US" dirty="0"/>
+          </a:p>
+        </p:txBody>
+      </p:sp>
+      <p:pic>
+        <p:nvPicPr>
+          <p:cNvPr id="3075" name="Picture 3"/>
+          <p:cNvPicPr>
+            <a:picLocks noChangeAspect="1" noChangeArrowheads="1"/>
+          </p:cNvPicPr>
+          <p:nvPr/>
+        </p:nvPicPr>
+        <p:blipFill>
+          <a:blip r:embed="rId2">
+            <a:extLst>
+              <a:ext uri="{28A0092B-C50C-407E-A947-70E740481C1C}">
+                <a14:useLocalDpi xmlns:a14="http://schemas.microsoft.com/office/drawing/2010/main" val="0"/>
+              </a:ext>
+            </a:extLst>
+          </a:blip>
+          <a:srcRect/>
+          <a:stretch>
+            <a:fillRect/>
+          </a:stretch>
+        </p:blipFill>
+        <p:spPr bwMode="auto">
+          <a:xfrm>
+            <a:off x="115276" y="1352550"/>
+            <a:ext cx="8963025" cy="4819650"/>
+          </a:xfrm>
+          <a:prstGeom prst="rect">
+            <a:avLst/>
+          </a:prstGeom>
+          <a:noFill/>
+          <a:ln>
+            <a:noFill/>
+          </a:ln>
+          <a:extLst>
+            <a:ext uri="{909E8E84-426E-40DD-AFC4-6F175D3DCCD1}">
+              <a14:hiddenFill xmlns:a14="http://schemas.microsoft.com/office/drawing/2010/main">
+                <a:solidFill>
+                  <a:schemeClr val="accent1"/>
+                </a:solidFill>
+              </a14:hiddenFill>
+            </a:ext>
+            <a:ext uri="{91240B29-F687-4F45-9708-019B960494DF}">
+              <a14:hiddenLine xmlns:a14="http://schemas.microsoft.com/office/drawing/2010/main" w="9525">
+                <a:solidFill>
+                  <a:schemeClr val="tx1"/>
+                </a:solidFill>
+                <a:miter lim="800000"/>
+                <a:headEnd/>
+                <a:tailEnd/>
+              </a14:hiddenLine>
+            </a:ext>
+          </a:extLst>
+        </p:spPr>
+      </p:pic>
+    </p:spTree>
+    <p:extLst>
+      <p:ext uri="{BB962C8B-B14F-4D97-AF65-F5344CB8AC3E}">
+        <p14:creationId xmlns:p14="http://schemas.microsoft.com/office/powerpoint/2010/main" val="1572836770"/>
+      </p:ext>
+    </p:extLst>
+  </p:cSld>
+  <p:clrMapOvr>
+    <a:masterClrMapping/>
+  </p:clrMapOvr>
+</p:sld>
+</file>
+
+<file path=ppt/slides/slide16.xml><?xml version="1.0" encoding="utf-8"?>
 <p:sld xmlns:a="http://schemas.openxmlformats.org/drawingml/2006/main" xmlns:r="http://schemas.openxmlformats.org/officeDocument/2006/relationships" xmlns:p="http://schemas.openxmlformats.org/presentationml/2006/main">
   <p:cSld>
     <p:spTree>
@@ -3909,7 +4198,7 @@
 </p:sld>
 </file>
 
-<file path=ppt/slides/slide14.xml><?xml version="1.0" encoding="utf-8"?>
+<file path=ppt/slides/slide17.xml><?xml version="1.0" encoding="utf-8"?>
 <p:sld xmlns:a="http://schemas.openxmlformats.org/drawingml/2006/main" xmlns:r="http://schemas.openxmlformats.org/officeDocument/2006/relationships" xmlns:p="http://schemas.openxmlformats.org/presentationml/2006/main">
   <p:cSld>
     <p:spTree>
@@ -3943,13 +4232,22 @@
           </a:xfrm>
         </p:spPr>
         <p:txBody>
-          <a:bodyPr/>
+          <a:bodyPr>
+            <a:normAutofit fontScale="90000"/>
+          </a:bodyPr>
           <a:lstStyle/>
           <a:p>
             <a:r>
               <a:rPr lang="en-US" dirty="0" smtClean="0"/>
-              <a:t>The end</a:t>
-            </a:r>
+              <a:t>The </a:t>
+            </a:r>
+            <a:r>
+              <a:rPr lang="en-US" dirty="0" smtClean="0"/>
+              <a:t>end</a:t>
+            </a:r>
+            <a:br>
+              <a:rPr lang="en-US" dirty="0" smtClean="0"/>
+            </a:br>
             <a:endParaRPr lang="en-US" dirty="0"/>
           </a:p>
         </p:txBody>
@@ -4240,24 +4538,12 @@
               <a:rPr lang="en-US" dirty="0" smtClean="0"/>
               <a:t>38</a:t>
             </a:r>
-            <a:r>
-              <a:rPr lang="en-US" dirty="0" smtClean="0"/>
-              <a:t/>
-            </a:r>
             <a:br>
               <a:rPr lang="en-US" dirty="0" smtClean="0"/>
             </a:br>
             <a:r>
               <a:rPr lang="en-US" dirty="0" smtClean="0"/>
-              <a:t>----  =   </a:t>
-            </a:r>
-            <a:r>
-              <a:rPr lang="en-US" dirty="0" smtClean="0"/>
-              <a:t>0.95  </a:t>
-            </a:r>
-            <a:r>
-              <a:rPr lang="en-US" dirty="0" smtClean="0"/>
-              <a:t>points per hour</a:t>
+              <a:t>----  =   0.95  points per hour</a:t>
             </a:r>
             <a:br>
               <a:rPr lang="en-US" dirty="0" smtClean="0"/>
@@ -4366,11 +4652,7 @@
                     <a:p>
                       <a:r>
                         <a:rPr lang="en-US" dirty="0" smtClean="0"/>
-                        <a:t>#</a:t>
-                      </a:r>
-                      <a:r>
-                        <a:rPr lang="en-US" dirty="0" smtClean="0"/>
-                        <a:t>264 export defect</a:t>
+                        <a:t>#264 export defect</a:t>
                       </a:r>
                       <a:endParaRPr lang="en-US" dirty="0"/>
                     </a:p>
@@ -4424,11 +4706,7 @@
                     <a:p>
                       <a:r>
                         <a:rPr lang="en-US" dirty="0" smtClean="0"/>
-                        <a:t>#</a:t>
-                      </a:r>
-                      <a:r>
-                        <a:rPr lang="en-US" dirty="0" smtClean="0"/>
-                        <a:t>247 import defect</a:t>
+                        <a:t>#247 import defect</a:t>
                       </a:r>
                       <a:endParaRPr lang="en-US" dirty="0"/>
                     </a:p>
@@ -4482,11 +4760,7 @@
                     <a:p>
                       <a:r>
                         <a:rPr lang="en-US" dirty="0" smtClean="0"/>
-                        <a:t>#</a:t>
-                      </a:r>
-                      <a:r>
-                        <a:rPr lang="en-US" dirty="0" smtClean="0"/>
-                        <a:t>248</a:t>
+                        <a:t>#248</a:t>
                       </a:r>
                       <a:r>
                         <a:rPr lang="en-US" baseline="0" dirty="0" smtClean="0"/>
@@ -4544,11 +4818,7 @@
                     <a:p>
                       <a:r>
                         <a:rPr lang="en-US" dirty="0" smtClean="0"/>
-                        <a:t>#</a:t>
-                      </a:r>
-                      <a:r>
-                        <a:rPr lang="en-US" dirty="0" smtClean="0"/>
-                        <a:t>249 compound information defect</a:t>
+                        <a:t>#249 compound information defect</a:t>
                       </a:r>
                       <a:endParaRPr lang="en-US" dirty="0"/>
                     </a:p>
@@ -4602,11 +4872,7 @@
                     <a:p>
                       <a:r>
                         <a:rPr lang="en-US" dirty="0" smtClean="0"/>
-                        <a:t>#</a:t>
-                      </a:r>
-                      <a:r>
-                        <a:rPr lang="en-US" dirty="0" smtClean="0"/>
-                        <a:t>250 edit compound defect</a:t>
+                        <a:t>#250 edit compound defect</a:t>
                       </a:r>
                       <a:endParaRPr lang="en-US" dirty="0"/>
                     </a:p>
@@ -4924,11 +5190,7 @@
                     <a:p>
                       <a:r>
                         <a:rPr lang="en-US" dirty="0" smtClean="0"/>
-                        <a:t>Import </a:t>
-                      </a:r>
-                      <a:r>
-                        <a:rPr lang="en-US" dirty="0" smtClean="0"/>
-                        <a:t>Defect</a:t>
+                        <a:t>Import Defect</a:t>
                       </a:r>
                       <a:endParaRPr lang="en-US" dirty="0"/>
                     </a:p>
@@ -4990,11 +5252,7 @@
                     <a:p>
                       <a:r>
                         <a:rPr lang="en-US" dirty="0" smtClean="0"/>
-                        <a:t>Import </a:t>
-                      </a:r>
-                      <a:r>
-                        <a:rPr lang="en-US" dirty="0" smtClean="0"/>
-                        <a:t>Defect</a:t>
+                        <a:t>Import Defect</a:t>
                       </a:r>
                       <a:endParaRPr lang="en-US" dirty="0"/>
                     </a:p>
@@ -5056,11 +5314,7 @@
                     <a:p>
                       <a:r>
                         <a:rPr lang="en-US" dirty="0" smtClean="0"/>
-                        <a:t>export </a:t>
-                      </a:r>
-                      <a:r>
-                        <a:rPr lang="en-US" dirty="0" smtClean="0"/>
-                        <a:t>Defect</a:t>
+                        <a:t>export Defect</a:t>
                       </a:r>
                       <a:endParaRPr lang="en-US" dirty="0"/>
                     </a:p>
@@ -5122,11 +5376,7 @@
                     <a:p>
                       <a:r>
                         <a:rPr lang="en-US" dirty="0" smtClean="0"/>
-                        <a:t>export </a:t>
-                      </a:r>
-                      <a:r>
-                        <a:rPr lang="en-US" dirty="0" smtClean="0"/>
-                        <a:t>Defect</a:t>
+                        <a:t>export Defect</a:t>
                       </a:r>
                       <a:endParaRPr lang="en-US" dirty="0"/>
                     </a:p>
@@ -5644,11 +5894,7 @@
                     <a:p>
                       <a:r>
                         <a:rPr lang="en-US" dirty="0" smtClean="0"/>
-                        <a:t>Meet </a:t>
-                      </a:r>
-                      <a:r>
-                        <a:rPr lang="en-US" dirty="0" smtClean="0"/>
-                        <a:t>with client</a:t>
+                        <a:t>Meet with client</a:t>
                       </a:r>
                       <a:endParaRPr lang="en-US" dirty="0"/>
                     </a:p>
@@ -5994,7 +6240,7 @@
         </p:nvGraphicFramePr>
         <p:xfrm>
           <a:off x="762000" y="1447800"/>
-          <a:ext cx="7833276" cy="4724576"/>
+          <a:ext cx="7833276" cy="4748645"/>
         </p:xfrm>
         <a:graphic>
           <a:graphicData uri="http://schemas.openxmlformats.org/drawingml/2006/table">
@@ -6537,11 +6783,7 @@
           <a:p>
             <a:r>
               <a:rPr lang="en-US" sz="3600" dirty="0" smtClean="0"/>
-              <a:t>Compound Information sequence </a:t>
-            </a:r>
-            <a:r>
-              <a:rPr lang="en-US" sz="3600" dirty="0" smtClean="0"/>
-              <a:t>Diagram</a:t>
+              <a:t>Compound Information sequence Diagram</a:t>
             </a:r>
             <a:endParaRPr lang="en-US" sz="3600" dirty="0"/>
           </a:p>

</xml_diff>